<commit_message>
Update intro and wrap up
</commit_message>
<xml_diff>
--- a/Slides/6_WrapUp.pptx
+++ b/Slides/6_WrapUp.pptx
@@ -5,7 +5,7 @@
     <p:sldMasterId id="2147483648" r:id="rId1"/>
   </p:sldMasterIdLst>
   <p:notesMasterIdLst>
-    <p:notesMasterId r:id="rId10"/>
+    <p:notesMasterId r:id="rId11"/>
   </p:notesMasterIdLst>
   <p:sldIdLst>
     <p:sldId id="319" r:id="rId2"/>
@@ -16,6 +16,7 @@
     <p:sldId id="336" r:id="rId7"/>
     <p:sldId id="354" r:id="rId8"/>
     <p:sldId id="361" r:id="rId9"/>
+    <p:sldId id="272" r:id="rId10"/>
   </p:sldIdLst>
   <p:sldSz cx="9144000" cy="5143500" type="screen16x9"/>
   <p:notesSz cx="6858000" cy="9144000"/>
@@ -589,7 +590,7 @@
           <a:p>
             <a:fld id="{C03C6563-76E9-3447-AC46-62A637AF2723}" type="datetimeFigureOut">
               <a:rPr lang="en-US" smtClean="0"/>
-              <a:t>6/24/24</a:t>
+              <a:t>10/2/24</a:t>
             </a:fld>
             <a:endParaRPr lang="en-US"/>
           </a:p>
@@ -3637,7 +3638,7 @@
           <a:p>
             <a:fld id="{1B5E5853-23B0-2344-8ED6-D2879B889C2E}" type="datetimeFigureOut">
               <a:rPr lang="en-US" smtClean="0"/>
-              <a:t>6/24/24</a:t>
+              <a:t>10/2/24</a:t>
             </a:fld>
             <a:endParaRPr lang="en-US"/>
           </a:p>
@@ -3879,7 +3880,7 @@
           <a:p>
             <a:fld id="{1B5E5853-23B0-2344-8ED6-D2879B889C2E}" type="datetimeFigureOut">
               <a:rPr lang="en-US" smtClean="0"/>
-              <a:t>6/24/24</a:t>
+              <a:t>10/2/24</a:t>
             </a:fld>
             <a:endParaRPr lang="en-US"/>
           </a:p>
@@ -4049,7 +4050,7 @@
           <a:p>
             <a:fld id="{1B5E5853-23B0-2344-8ED6-D2879B889C2E}" type="datetimeFigureOut">
               <a:rPr lang="en-US" smtClean="0"/>
-              <a:t>6/24/24</a:t>
+              <a:t>10/2/24</a:t>
             </a:fld>
             <a:endParaRPr lang="en-US"/>
           </a:p>
@@ -4295,7 +4296,7 @@
           <a:p>
             <a:fld id="{1B5E5853-23B0-2344-8ED6-D2879B889C2E}" type="datetimeFigureOut">
               <a:rPr lang="en-US" smtClean="0"/>
-              <a:t>6/24/24</a:t>
+              <a:t>10/2/24</a:t>
             </a:fld>
             <a:endParaRPr lang="en-US"/>
           </a:p>
@@ -4583,7 +4584,7 @@
           <a:p>
             <a:fld id="{1B5E5853-23B0-2344-8ED6-D2879B889C2E}" type="datetimeFigureOut">
               <a:rPr lang="en-US" smtClean="0"/>
-              <a:t>6/24/24</a:t>
+              <a:t>10/2/24</a:t>
             </a:fld>
             <a:endParaRPr lang="en-US"/>
           </a:p>
@@ -5010,7 +5011,7 @@
           <a:p>
             <a:fld id="{1B5E5853-23B0-2344-8ED6-D2879B889C2E}" type="datetimeFigureOut">
               <a:rPr lang="en-US" smtClean="0"/>
-              <a:t>6/24/24</a:t>
+              <a:t>10/2/24</a:t>
             </a:fld>
             <a:endParaRPr lang="en-US"/>
           </a:p>
@@ -5128,7 +5129,7 @@
           <a:p>
             <a:fld id="{1B5E5853-23B0-2344-8ED6-D2879B889C2E}" type="datetimeFigureOut">
               <a:rPr lang="en-US" smtClean="0"/>
-              <a:t>6/24/24</a:t>
+              <a:t>10/2/24</a:t>
             </a:fld>
             <a:endParaRPr lang="en-US"/>
           </a:p>
@@ -5551,7 +5552,7 @@
           <a:p>
             <a:fld id="{1B5E5853-23B0-2344-8ED6-D2879B889C2E}" type="datetimeFigureOut">
               <a:rPr lang="en-US" smtClean="0"/>
-              <a:t>6/24/24</a:t>
+              <a:t>10/2/24</a:t>
             </a:fld>
             <a:endParaRPr lang="en-US"/>
           </a:p>
@@ -5828,7 +5829,7 @@
           <a:p>
             <a:fld id="{1B5E5853-23B0-2344-8ED6-D2879B889C2E}" type="datetimeFigureOut">
               <a:rPr lang="en-US" smtClean="0"/>
-              <a:t>6/24/24</a:t>
+              <a:t>10/2/24</a:t>
             </a:fld>
             <a:endParaRPr lang="en-US"/>
           </a:p>
@@ -6081,7 +6082,7 @@
           <a:p>
             <a:fld id="{1B5E5853-23B0-2344-8ED6-D2879B889C2E}" type="datetimeFigureOut">
               <a:rPr lang="en-US" smtClean="0"/>
-              <a:t>6/24/24</a:t>
+              <a:t>10/2/24</a:t>
             </a:fld>
             <a:endParaRPr lang="en-US"/>
           </a:p>
@@ -6251,7 +6252,7 @@
           <a:p>
             <a:fld id="{1B5E5853-23B0-2344-8ED6-D2879B889C2E}" type="datetimeFigureOut">
               <a:rPr lang="en-US" smtClean="0"/>
-              <a:t>6/24/24</a:t>
+              <a:t>10/2/24</a:t>
             </a:fld>
             <a:endParaRPr lang="en-US"/>
           </a:p>
@@ -6431,7 +6432,7 @@
           <a:p>
             <a:fld id="{1B5E5853-23B0-2344-8ED6-D2879B889C2E}" type="datetimeFigureOut">
               <a:rPr lang="en-US" smtClean="0"/>
-              <a:t>6/24/24</a:t>
+              <a:t>10/2/24</a:t>
             </a:fld>
             <a:endParaRPr lang="en-US"/>
           </a:p>
@@ -9368,7 +9369,7 @@
           <a:p>
             <a:fld id="{1B5E5853-23B0-2344-8ED6-D2879B889C2E}" type="datetimeFigureOut">
               <a:rPr lang="en-US" smtClean="0"/>
-              <a:t>6/24/24</a:t>
+              <a:t>10/2/24</a:t>
             </a:fld>
             <a:endParaRPr lang="en-US"/>
           </a:p>
@@ -11265,6 +11266,352 @@
       <p:bldP spid="4" grpId="0"/>
     </p:bldLst>
   </p:timing>
+</p:sld>
+</file>
+
+<file path=ppt/slides/slide9.xml><?xml version="1.0" encoding="utf-8"?>
+<p:sld xmlns:a="http://schemas.openxmlformats.org/drawingml/2006/main" xmlns:r="http://schemas.openxmlformats.org/officeDocument/2006/relationships" xmlns:p="http://schemas.openxmlformats.org/presentationml/2006/main">
+  <p:cSld>
+    <p:spTree>
+      <p:nvGrpSpPr>
+        <p:cNvPr id="1" name=""/>
+        <p:cNvGrpSpPr/>
+        <p:nvPr/>
+      </p:nvGrpSpPr>
+      <p:grpSpPr>
+        <a:xfrm>
+          <a:off x="0" y="0"/>
+          <a:ext cx="0" cy="0"/>
+          <a:chOff x="0" y="0"/>
+          <a:chExt cx="0" cy="0"/>
+        </a:xfrm>
+      </p:grpSpPr>
+      <p:sp>
+        <p:nvSpPr>
+          <p:cNvPr id="2" name="Text Placeholder 1"/>
+          <p:cNvSpPr>
+            <a:spLocks noGrp="1"/>
+          </p:cNvSpPr>
+          <p:nvPr>
+            <p:ph type="body" sz="quarter" idx="10"/>
+          </p:nvPr>
+        </p:nvSpPr>
+        <p:spPr/>
+        <p:txBody>
+          <a:bodyPr/>
+          <a:lstStyle/>
+          <a:p>
+            <a:r>
+              <a:rPr lang="en-US" dirty="0"/>
+              <a:t>Upcoming events and workshops </a:t>
+            </a:r>
+          </a:p>
+        </p:txBody>
+      </p:sp>
+      <p:sp>
+        <p:nvSpPr>
+          <p:cNvPr id="4" name="Text Placeholder 3"/>
+          <p:cNvSpPr>
+            <a:spLocks noGrp="1"/>
+          </p:cNvSpPr>
+          <p:nvPr>
+            <p:ph type="body" sz="quarter" idx="12"/>
+          </p:nvPr>
+        </p:nvSpPr>
+        <p:spPr>
+          <a:xfrm>
+            <a:off x="377744" y="857250"/>
+            <a:ext cx="8382000" cy="3943060"/>
+          </a:xfrm>
+        </p:spPr>
+        <p:txBody>
+          <a:bodyPr>
+            <a:normAutofit/>
+          </a:bodyPr>
+          <a:lstStyle/>
+          <a:p>
+            <a:pPr marL="0" indent="0">
+              <a:buNone/>
+            </a:pPr>
+            <a:r>
+              <a:rPr lang="en-US" b="1" dirty="0"/>
+              <a:t>Teaching workshops</a:t>
+            </a:r>
+          </a:p>
+          <a:p>
+            <a:pPr marL="0" indent="0">
+              <a:buNone/>
+            </a:pPr>
+            <a:r>
+              <a:rPr lang="en-US" dirty="0">
+                <a:effectLst/>
+              </a:rPr>
+              <a:t>Monday 14 October                  Hands on LLM workshop</a:t>
+            </a:r>
+          </a:p>
+          <a:p>
+            <a:pPr marL="0" indent="0">
+              <a:buNone/>
+            </a:pPr>
+            <a:r>
+              <a:rPr lang="en-US" dirty="0">
+                <a:effectLst/>
+              </a:rPr>
+              <a:t>Wednesday 6 November          An Introduction to Diffusion Models in Generative AI</a:t>
+            </a:r>
+          </a:p>
+          <a:p>
+            <a:pPr marL="0" indent="0">
+              <a:buNone/>
+            </a:pPr>
+            <a:r>
+              <a:rPr lang="en-US" dirty="0">
+                <a:effectLst/>
+              </a:rPr>
+              <a:t>Monday 18 November              Publishing and Packaging Python Code for Research</a:t>
+            </a:r>
+          </a:p>
+          <a:p>
+            <a:pPr marL="0" indent="0">
+              <a:buNone/>
+            </a:pPr>
+            <a:r>
+              <a:rPr lang="en-US" dirty="0">
+                <a:effectLst/>
+              </a:rPr>
+              <a:t>Monday 2 December                An Introduction to Docker</a:t>
+            </a:r>
+          </a:p>
+          <a:p>
+            <a:pPr marL="0" indent="0">
+              <a:buNone/>
+            </a:pPr>
+            <a:r>
+              <a:rPr lang="en-US" dirty="0">
+                <a:effectLst/>
+              </a:rPr>
+              <a:t>Wednesday 4 December          Hands on AI workshop</a:t>
+            </a:r>
+          </a:p>
+          <a:p>
+            <a:pPr marL="0" indent="0">
+              <a:buNone/>
+            </a:pPr>
+            <a:endParaRPr lang="en-US" dirty="0"/>
+          </a:p>
+          <a:p>
+            <a:pPr marL="0" indent="0">
+              <a:buNone/>
+            </a:pPr>
+            <a:r>
+              <a:rPr lang="en-US" b="1" dirty="0"/>
+              <a:t>AI Cafés </a:t>
+            </a:r>
+          </a:p>
+          <a:p>
+            <a:pPr marL="0" indent="0">
+              <a:buNone/>
+            </a:pPr>
+            <a:r>
+              <a:rPr lang="en-US"/>
+              <a:t>Wednesday </a:t>
+            </a:r>
+            <a:r>
+              <a:rPr lang="en-US" dirty="0"/>
+              <a:t>23 October – West Hub </a:t>
+            </a:r>
+          </a:p>
+          <a:p>
+            <a:pPr marL="0" indent="0">
+              <a:buNone/>
+            </a:pPr>
+            <a:r>
+              <a:rPr lang="en-US" dirty="0"/>
+              <a:t>Monday 11 November – St Edmund’s College  </a:t>
+            </a:r>
+          </a:p>
+          <a:p>
+            <a:pPr marL="0" indent="0">
+              <a:buNone/>
+            </a:pPr>
+            <a:endParaRPr lang="en-US" dirty="0"/>
+          </a:p>
+        </p:txBody>
+      </p:sp>
+      <p:sp>
+        <p:nvSpPr>
+          <p:cNvPr id="5" name="TextBox 4">
+            <a:extLst>
+              <a:ext uri="{FF2B5EF4-FFF2-40B4-BE49-F238E27FC236}">
+                <a16:creationId xmlns:a16="http://schemas.microsoft.com/office/drawing/2014/main" id="{D883AC1F-BCBF-79B4-2610-C9E531D50468}"/>
+              </a:ext>
+            </a:extLst>
+          </p:cNvPr>
+          <p:cNvSpPr txBox="1"/>
+          <p:nvPr/>
+        </p:nvSpPr>
+        <p:spPr>
+          <a:xfrm>
+            <a:off x="6313821" y="1082881"/>
+            <a:ext cx="2830180" cy="3000821"/>
+          </a:xfrm>
+          <a:prstGeom prst="rect">
+            <a:avLst/>
+          </a:prstGeom>
+          <a:noFill/>
+        </p:spPr>
+        <p:txBody>
+          <a:bodyPr wrap="square" rtlCol="0">
+            <a:spAutoFit/>
+          </a:bodyPr>
+          <a:lstStyle/>
+          <a:p>
+            <a:r>
+              <a:rPr lang="en-US" sz="1350" dirty="0">
+                <a:latin typeface="Helvetica" panose="020B0604020202020204" pitchFamily="34" charset="0"/>
+                <a:cs typeface="Helvetica" panose="020B0604020202020204" pitchFamily="34" charset="0"/>
+              </a:rPr>
+              <a:t>Sign up through our events page:</a:t>
+            </a:r>
+          </a:p>
+          <a:p>
+            <a:endParaRPr lang="en-US" sz="1350" dirty="0">
+              <a:latin typeface="Helvetica" panose="020B0604020202020204" pitchFamily="34" charset="0"/>
+              <a:cs typeface="Helvetica" panose="020B0604020202020204" pitchFamily="34" charset="0"/>
+            </a:endParaRPr>
+          </a:p>
+          <a:p>
+            <a:endParaRPr lang="en-US" sz="1350" dirty="0">
+              <a:latin typeface="Helvetica" panose="020B0604020202020204" pitchFamily="34" charset="0"/>
+              <a:cs typeface="Helvetica" panose="020B0604020202020204" pitchFamily="34" charset="0"/>
+            </a:endParaRPr>
+          </a:p>
+          <a:p>
+            <a:endParaRPr lang="en-US" sz="1350" dirty="0">
+              <a:latin typeface="Helvetica" panose="020B0604020202020204" pitchFamily="34" charset="0"/>
+              <a:cs typeface="Helvetica" panose="020B0604020202020204" pitchFamily="34" charset="0"/>
+            </a:endParaRPr>
+          </a:p>
+          <a:p>
+            <a:endParaRPr lang="en-US" sz="1350" dirty="0">
+              <a:latin typeface="Helvetica" panose="020B0604020202020204" pitchFamily="34" charset="0"/>
+              <a:cs typeface="Helvetica" panose="020B0604020202020204" pitchFamily="34" charset="0"/>
+            </a:endParaRPr>
+          </a:p>
+          <a:p>
+            <a:endParaRPr lang="en-US" sz="1350" dirty="0">
+              <a:latin typeface="Helvetica" panose="020B0604020202020204" pitchFamily="34" charset="0"/>
+              <a:cs typeface="Helvetica" panose="020B0604020202020204" pitchFamily="34" charset="0"/>
+            </a:endParaRPr>
+          </a:p>
+          <a:p>
+            <a:endParaRPr lang="en-US" sz="1350" dirty="0">
+              <a:latin typeface="Helvetica" panose="020B0604020202020204" pitchFamily="34" charset="0"/>
+              <a:cs typeface="Helvetica" panose="020B0604020202020204" pitchFamily="34" charset="0"/>
+            </a:endParaRPr>
+          </a:p>
+          <a:p>
+            <a:endParaRPr lang="en-US" sz="1350" dirty="0">
+              <a:latin typeface="Helvetica" panose="020B0604020202020204" pitchFamily="34" charset="0"/>
+              <a:cs typeface="Helvetica" panose="020B0604020202020204" pitchFamily="34" charset="0"/>
+            </a:endParaRPr>
+          </a:p>
+          <a:p>
+            <a:endParaRPr lang="en-US" sz="1350" dirty="0">
+              <a:latin typeface="Helvetica" panose="020B0604020202020204" pitchFamily="34" charset="0"/>
+              <a:cs typeface="Helvetica" panose="020B0604020202020204" pitchFamily="34" charset="0"/>
+            </a:endParaRPr>
+          </a:p>
+          <a:p>
+            <a:endParaRPr lang="en-US" sz="1350" dirty="0">
+              <a:latin typeface="Helvetica" panose="020B0604020202020204" pitchFamily="34" charset="0"/>
+              <a:cs typeface="Helvetica" panose="020B0604020202020204" pitchFamily="34" charset="0"/>
+            </a:endParaRPr>
+          </a:p>
+          <a:p>
+            <a:r>
+              <a:rPr lang="en-US" sz="1350" dirty="0">
+                <a:latin typeface="Helvetica" panose="020B0604020202020204" pitchFamily="34" charset="0"/>
+                <a:cs typeface="Helvetica" panose="020B0604020202020204" pitchFamily="34" charset="0"/>
+              </a:rPr>
+              <a:t>Get in touch for further information and support: </a:t>
+            </a:r>
+          </a:p>
+          <a:p>
+            <a:endParaRPr lang="en-US" sz="1350" dirty="0">
+              <a:latin typeface="Helvetica" panose="020B0604020202020204" pitchFamily="34" charset="0"/>
+              <a:cs typeface="Helvetica" panose="020B0604020202020204" pitchFamily="34" charset="0"/>
+            </a:endParaRPr>
+          </a:p>
+          <a:p>
+            <a:r>
+              <a:rPr lang="en-US" sz="1350" dirty="0">
+                <a:latin typeface="Helvetica" panose="020B0604020202020204" pitchFamily="34" charset="0"/>
+                <a:cs typeface="Helvetica" panose="020B0604020202020204" pitchFamily="34" charset="0"/>
+                <a:hlinkClick r:id="rId2"/>
+              </a:rPr>
+              <a:t>accelerate-mle@cst.cam.ac.uk</a:t>
+            </a:r>
+            <a:r>
+              <a:rPr lang="en-US" sz="1350" dirty="0">
+                <a:latin typeface="Helvetica" panose="020B0604020202020204" pitchFamily="34" charset="0"/>
+                <a:cs typeface="Helvetica" panose="020B0604020202020204" pitchFamily="34" charset="0"/>
+              </a:rPr>
+              <a:t> </a:t>
+            </a:r>
+            <a:endParaRPr lang="en-GB" sz="1350" dirty="0">
+              <a:latin typeface="Helvetica" panose="020B0604020202020204" pitchFamily="34" charset="0"/>
+              <a:cs typeface="Helvetica" panose="020B0604020202020204" pitchFamily="34" charset="0"/>
+            </a:endParaRPr>
+          </a:p>
+        </p:txBody>
+      </p:sp>
+      <p:pic>
+        <p:nvPicPr>
+          <p:cNvPr id="8" name="Picture 7" descr="A qr code with a white background&#10;&#10;Description automatically generated">
+            <a:extLst>
+              <a:ext uri="{FF2B5EF4-FFF2-40B4-BE49-F238E27FC236}">
+                <a16:creationId xmlns:a16="http://schemas.microsoft.com/office/drawing/2014/main" id="{ECEC139F-BC03-CC66-6071-8C0407E6C9F2}"/>
+              </a:ext>
+            </a:extLst>
+          </p:cNvPr>
+          <p:cNvPicPr>
+            <a:picLocks noChangeAspect="1"/>
+          </p:cNvPicPr>
+          <p:nvPr/>
+        </p:nvPicPr>
+        <p:blipFill>
+          <a:blip r:embed="rId3">
+            <a:extLst>
+              <a:ext uri="{28A0092B-C50C-407E-A947-70E740481C1C}">
+                <a14:useLocalDpi xmlns:a14="http://schemas.microsoft.com/office/drawing/2010/main" val="0"/>
+              </a:ext>
+            </a:extLst>
+          </a:blip>
+          <a:stretch>
+            <a:fillRect/>
+          </a:stretch>
+        </p:blipFill>
+        <p:spPr>
+          <a:xfrm>
+            <a:off x="7239664" y="1432279"/>
+            <a:ext cx="1243385" cy="1261760"/>
+          </a:xfrm>
+          <a:prstGeom prst="rect">
+            <a:avLst/>
+          </a:prstGeom>
+        </p:spPr>
+      </p:pic>
+    </p:spTree>
+    <p:extLst>
+      <p:ext uri="{BB962C8B-B14F-4D97-AF65-F5344CB8AC3E}">
+        <p14:creationId xmlns:p14="http://schemas.microsoft.com/office/powerpoint/2010/main" val="385288236"/>
+      </p:ext>
+    </p:extLst>
+  </p:cSld>
+  <p:clrMapOvr>
+    <a:masterClrMapping/>
+  </p:clrMapOvr>
 </p:sld>
 </file>
 

</xml_diff>